<commit_message>
fix usec to nsec
</commit_message>
<xml_diff>
--- a/datasheets/IR_controller_hints.pptx
+++ b/datasheets/IR_controller_hints.pptx
@@ -157,10 +157,9 @@
           </a:lstStyle>
           <a:p>
             <a:r>
-              <a:rPr lang="en-US" smtClean="0"/>
+              <a:rPr lang="en-US"/>
               <a:t>Click to edit Master title style</a:t>
             </a:r>
-            <a:endParaRPr lang="en-US"/>
           </a:p>
         </p:txBody>
       </p:sp>
@@ -222,10 +221,9 @@
           </a:lstStyle>
           <a:p>
             <a:r>
-              <a:rPr lang="en-US" smtClean="0"/>
+              <a:rPr lang="en-US"/>
               <a:t>Click to edit Master subtitle style</a:t>
             </a:r>
-            <a:endParaRPr lang="en-US"/>
           </a:p>
         </p:txBody>
       </p:sp>
@@ -246,7 +244,7 @@
           <a:p>
             <a:fld id="{B77C8AF6-092B-463F-9665-A46E0F51F534}" type="datetimeFigureOut">
               <a:rPr lang="en-US" smtClean="0"/>
-              <a:t>5/14/2021</a:t>
+              <a:t>5/18/2023</a:t>
             </a:fld>
             <a:endParaRPr lang="en-US"/>
           </a:p>
@@ -340,10 +338,9 @@
           <a:lstStyle/>
           <a:p>
             <a:r>
-              <a:rPr lang="en-US" smtClean="0"/>
+              <a:rPr lang="en-US"/>
               <a:t>Click to edit Master title style</a:t>
             </a:r>
-            <a:endParaRPr lang="en-US"/>
           </a:p>
         </p:txBody>
       </p:sp>
@@ -364,38 +361,37 @@
           <a:p>
             <a:pPr lvl="0"/>
             <a:r>
-              <a:rPr lang="en-US" smtClean="0"/>
+              <a:rPr lang="en-US"/>
               <a:t>Edit Master text styles</a:t>
             </a:r>
           </a:p>
           <a:p>
             <a:pPr lvl="1"/>
             <a:r>
-              <a:rPr lang="en-US" smtClean="0"/>
+              <a:rPr lang="en-US"/>
               <a:t>Second level</a:t>
             </a:r>
           </a:p>
           <a:p>
             <a:pPr lvl="2"/>
             <a:r>
-              <a:rPr lang="en-US" smtClean="0"/>
+              <a:rPr lang="en-US"/>
               <a:t>Third level</a:t>
             </a:r>
           </a:p>
           <a:p>
             <a:pPr lvl="3"/>
             <a:r>
-              <a:rPr lang="en-US" smtClean="0"/>
+              <a:rPr lang="en-US"/>
               <a:t>Fourth level</a:t>
             </a:r>
           </a:p>
           <a:p>
             <a:pPr lvl="4"/>
             <a:r>
-              <a:rPr lang="en-US" smtClean="0"/>
+              <a:rPr lang="en-US"/>
               <a:t>Fifth level</a:t>
             </a:r>
-            <a:endParaRPr lang="en-US"/>
           </a:p>
         </p:txBody>
       </p:sp>
@@ -416,7 +412,7 @@
           <a:p>
             <a:fld id="{B77C8AF6-092B-463F-9665-A46E0F51F534}" type="datetimeFigureOut">
               <a:rPr lang="en-US" smtClean="0"/>
-              <a:t>5/14/2021</a:t>
+              <a:t>5/18/2023</a:t>
             </a:fld>
             <a:endParaRPr lang="en-US"/>
           </a:p>
@@ -515,10 +511,9 @@
           <a:lstStyle/>
           <a:p>
             <a:r>
-              <a:rPr lang="en-US" smtClean="0"/>
+              <a:rPr lang="en-US"/>
               <a:t>Click to edit Master title style</a:t>
             </a:r>
-            <a:endParaRPr lang="en-US"/>
           </a:p>
         </p:txBody>
       </p:sp>
@@ -544,38 +539,37 @@
           <a:p>
             <a:pPr lvl="0"/>
             <a:r>
-              <a:rPr lang="en-US" smtClean="0"/>
+              <a:rPr lang="en-US"/>
               <a:t>Edit Master text styles</a:t>
             </a:r>
           </a:p>
           <a:p>
             <a:pPr lvl="1"/>
             <a:r>
-              <a:rPr lang="en-US" smtClean="0"/>
+              <a:rPr lang="en-US"/>
               <a:t>Second level</a:t>
             </a:r>
           </a:p>
           <a:p>
             <a:pPr lvl="2"/>
             <a:r>
-              <a:rPr lang="en-US" smtClean="0"/>
+              <a:rPr lang="en-US"/>
               <a:t>Third level</a:t>
             </a:r>
           </a:p>
           <a:p>
             <a:pPr lvl="3"/>
             <a:r>
-              <a:rPr lang="en-US" smtClean="0"/>
+              <a:rPr lang="en-US"/>
               <a:t>Fourth level</a:t>
             </a:r>
           </a:p>
           <a:p>
             <a:pPr lvl="4"/>
             <a:r>
-              <a:rPr lang="en-US" smtClean="0"/>
+              <a:rPr lang="en-US"/>
               <a:t>Fifth level</a:t>
             </a:r>
-            <a:endParaRPr lang="en-US"/>
           </a:p>
         </p:txBody>
       </p:sp>
@@ -596,7 +590,7 @@
           <a:p>
             <a:fld id="{B77C8AF6-092B-463F-9665-A46E0F51F534}" type="datetimeFigureOut">
               <a:rPr lang="en-US" smtClean="0"/>
-              <a:t>5/14/2021</a:t>
+              <a:t>5/18/2023</a:t>
             </a:fld>
             <a:endParaRPr lang="en-US"/>
           </a:p>
@@ -690,10 +684,9 @@
           <a:lstStyle/>
           <a:p>
             <a:r>
-              <a:rPr lang="en-US" smtClean="0"/>
+              <a:rPr lang="en-US"/>
               <a:t>Click to edit Master title style</a:t>
             </a:r>
-            <a:endParaRPr lang="en-US"/>
           </a:p>
         </p:txBody>
       </p:sp>
@@ -714,38 +707,37 @@
           <a:p>
             <a:pPr lvl="0"/>
             <a:r>
-              <a:rPr lang="en-US" smtClean="0"/>
+              <a:rPr lang="en-US"/>
               <a:t>Edit Master text styles</a:t>
             </a:r>
           </a:p>
           <a:p>
             <a:pPr lvl="1"/>
             <a:r>
-              <a:rPr lang="en-US" smtClean="0"/>
+              <a:rPr lang="en-US"/>
               <a:t>Second level</a:t>
             </a:r>
           </a:p>
           <a:p>
             <a:pPr lvl="2"/>
             <a:r>
-              <a:rPr lang="en-US" smtClean="0"/>
+              <a:rPr lang="en-US"/>
               <a:t>Third level</a:t>
             </a:r>
           </a:p>
           <a:p>
             <a:pPr lvl="3"/>
             <a:r>
-              <a:rPr lang="en-US" smtClean="0"/>
+              <a:rPr lang="en-US"/>
               <a:t>Fourth level</a:t>
             </a:r>
           </a:p>
           <a:p>
             <a:pPr lvl="4"/>
             <a:r>
-              <a:rPr lang="en-US" smtClean="0"/>
+              <a:rPr lang="en-US"/>
               <a:t>Fifth level</a:t>
             </a:r>
-            <a:endParaRPr lang="en-US"/>
           </a:p>
         </p:txBody>
       </p:sp>
@@ -766,7 +758,7 @@
           <a:p>
             <a:fld id="{B77C8AF6-092B-463F-9665-A46E0F51F534}" type="datetimeFigureOut">
               <a:rPr lang="en-US" smtClean="0"/>
-              <a:t>5/14/2021</a:t>
+              <a:t>5/18/2023</a:t>
             </a:fld>
             <a:endParaRPr lang="en-US"/>
           </a:p>
@@ -869,10 +861,9 @@
           </a:lstStyle>
           <a:p>
             <a:r>
-              <a:rPr lang="en-US" smtClean="0"/>
+              <a:rPr lang="en-US"/>
               <a:t>Click to edit Master title style</a:t>
             </a:r>
-            <a:endParaRPr lang="en-US"/>
           </a:p>
         </p:txBody>
       </p:sp>
@@ -989,7 +980,7 @@
           <a:p>
             <a:pPr lvl="0"/>
             <a:r>
-              <a:rPr lang="en-US" smtClean="0"/>
+              <a:rPr lang="en-US"/>
               <a:t>Edit Master text styles</a:t>
             </a:r>
           </a:p>
@@ -1012,7 +1003,7 @@
           <a:p>
             <a:fld id="{B77C8AF6-092B-463F-9665-A46E0F51F534}" type="datetimeFigureOut">
               <a:rPr lang="en-US" smtClean="0"/>
-              <a:t>5/14/2021</a:t>
+              <a:t>5/18/2023</a:t>
             </a:fld>
             <a:endParaRPr lang="en-US"/>
           </a:p>
@@ -1106,10 +1097,9 @@
           <a:lstStyle/>
           <a:p>
             <a:r>
-              <a:rPr lang="en-US" smtClean="0"/>
+              <a:rPr lang="en-US"/>
               <a:t>Click to edit Master title style</a:t>
             </a:r>
-            <a:endParaRPr lang="en-US"/>
           </a:p>
         </p:txBody>
       </p:sp>
@@ -1135,38 +1125,37 @@
           <a:p>
             <a:pPr lvl="0"/>
             <a:r>
-              <a:rPr lang="en-US" smtClean="0"/>
+              <a:rPr lang="en-US"/>
               <a:t>Edit Master text styles</a:t>
             </a:r>
           </a:p>
           <a:p>
             <a:pPr lvl="1"/>
             <a:r>
-              <a:rPr lang="en-US" smtClean="0"/>
+              <a:rPr lang="en-US"/>
               <a:t>Second level</a:t>
             </a:r>
           </a:p>
           <a:p>
             <a:pPr lvl="2"/>
             <a:r>
-              <a:rPr lang="en-US" smtClean="0"/>
+              <a:rPr lang="en-US"/>
               <a:t>Third level</a:t>
             </a:r>
           </a:p>
           <a:p>
             <a:pPr lvl="3"/>
             <a:r>
-              <a:rPr lang="en-US" smtClean="0"/>
+              <a:rPr lang="en-US"/>
               <a:t>Fourth level</a:t>
             </a:r>
           </a:p>
           <a:p>
             <a:pPr lvl="4"/>
             <a:r>
-              <a:rPr lang="en-US" smtClean="0"/>
+              <a:rPr lang="en-US"/>
               <a:t>Fifth level</a:t>
             </a:r>
-            <a:endParaRPr lang="en-US"/>
           </a:p>
         </p:txBody>
       </p:sp>
@@ -1192,38 +1181,37 @@
           <a:p>
             <a:pPr lvl="0"/>
             <a:r>
-              <a:rPr lang="en-US" smtClean="0"/>
+              <a:rPr lang="en-US"/>
               <a:t>Edit Master text styles</a:t>
             </a:r>
           </a:p>
           <a:p>
             <a:pPr lvl="1"/>
             <a:r>
-              <a:rPr lang="en-US" smtClean="0"/>
+              <a:rPr lang="en-US"/>
               <a:t>Second level</a:t>
             </a:r>
           </a:p>
           <a:p>
             <a:pPr lvl="2"/>
             <a:r>
-              <a:rPr lang="en-US" smtClean="0"/>
+              <a:rPr lang="en-US"/>
               <a:t>Third level</a:t>
             </a:r>
           </a:p>
           <a:p>
             <a:pPr lvl="3"/>
             <a:r>
-              <a:rPr lang="en-US" smtClean="0"/>
+              <a:rPr lang="en-US"/>
               <a:t>Fourth level</a:t>
             </a:r>
           </a:p>
           <a:p>
             <a:pPr lvl="4"/>
             <a:r>
-              <a:rPr lang="en-US" smtClean="0"/>
+              <a:rPr lang="en-US"/>
               <a:t>Fifth level</a:t>
             </a:r>
-            <a:endParaRPr lang="en-US"/>
           </a:p>
         </p:txBody>
       </p:sp>
@@ -1244,7 +1232,7 @@
           <a:p>
             <a:fld id="{B77C8AF6-092B-463F-9665-A46E0F51F534}" type="datetimeFigureOut">
               <a:rPr lang="en-US" smtClean="0"/>
-              <a:t>5/14/2021</a:t>
+              <a:t>5/18/2023</a:t>
             </a:fld>
             <a:endParaRPr lang="en-US"/>
           </a:p>
@@ -1343,10 +1331,9 @@
           <a:lstStyle/>
           <a:p>
             <a:r>
-              <a:rPr lang="en-US" smtClean="0"/>
+              <a:rPr lang="en-US"/>
               <a:t>Click to edit Master title style</a:t>
             </a:r>
-            <a:endParaRPr lang="en-US"/>
           </a:p>
         </p:txBody>
       </p:sp>
@@ -1409,7 +1396,7 @@
           <a:p>
             <a:pPr lvl="0"/>
             <a:r>
-              <a:rPr lang="en-US" smtClean="0"/>
+              <a:rPr lang="en-US"/>
               <a:t>Edit Master text styles</a:t>
             </a:r>
           </a:p>
@@ -1437,38 +1424,37 @@
           <a:p>
             <a:pPr lvl="0"/>
             <a:r>
-              <a:rPr lang="en-US" smtClean="0"/>
+              <a:rPr lang="en-US"/>
               <a:t>Edit Master text styles</a:t>
             </a:r>
           </a:p>
           <a:p>
             <a:pPr lvl="1"/>
             <a:r>
-              <a:rPr lang="en-US" smtClean="0"/>
+              <a:rPr lang="en-US"/>
               <a:t>Second level</a:t>
             </a:r>
           </a:p>
           <a:p>
             <a:pPr lvl="2"/>
             <a:r>
-              <a:rPr lang="en-US" smtClean="0"/>
+              <a:rPr lang="en-US"/>
               <a:t>Third level</a:t>
             </a:r>
           </a:p>
           <a:p>
             <a:pPr lvl="3"/>
             <a:r>
-              <a:rPr lang="en-US" smtClean="0"/>
+              <a:rPr lang="en-US"/>
               <a:t>Fourth level</a:t>
             </a:r>
           </a:p>
           <a:p>
             <a:pPr lvl="4"/>
             <a:r>
-              <a:rPr lang="en-US" smtClean="0"/>
+              <a:rPr lang="en-US"/>
               <a:t>Fifth level</a:t>
             </a:r>
-            <a:endParaRPr lang="en-US"/>
           </a:p>
         </p:txBody>
       </p:sp>
@@ -1531,7 +1517,7 @@
           <a:p>
             <a:pPr lvl="0"/>
             <a:r>
-              <a:rPr lang="en-US" smtClean="0"/>
+              <a:rPr lang="en-US"/>
               <a:t>Edit Master text styles</a:t>
             </a:r>
           </a:p>
@@ -1559,38 +1545,37 @@
           <a:p>
             <a:pPr lvl="0"/>
             <a:r>
-              <a:rPr lang="en-US" smtClean="0"/>
+              <a:rPr lang="en-US"/>
               <a:t>Edit Master text styles</a:t>
             </a:r>
           </a:p>
           <a:p>
             <a:pPr lvl="1"/>
             <a:r>
-              <a:rPr lang="en-US" smtClean="0"/>
+              <a:rPr lang="en-US"/>
               <a:t>Second level</a:t>
             </a:r>
           </a:p>
           <a:p>
             <a:pPr lvl="2"/>
             <a:r>
-              <a:rPr lang="en-US" smtClean="0"/>
+              <a:rPr lang="en-US"/>
               <a:t>Third level</a:t>
             </a:r>
           </a:p>
           <a:p>
             <a:pPr lvl="3"/>
             <a:r>
-              <a:rPr lang="en-US" smtClean="0"/>
+              <a:rPr lang="en-US"/>
               <a:t>Fourth level</a:t>
             </a:r>
           </a:p>
           <a:p>
             <a:pPr lvl="4"/>
             <a:r>
-              <a:rPr lang="en-US" smtClean="0"/>
+              <a:rPr lang="en-US"/>
               <a:t>Fifth level</a:t>
             </a:r>
-            <a:endParaRPr lang="en-US"/>
           </a:p>
         </p:txBody>
       </p:sp>
@@ -1611,7 +1596,7 @@
           <a:p>
             <a:fld id="{B77C8AF6-092B-463F-9665-A46E0F51F534}" type="datetimeFigureOut">
               <a:rPr lang="en-US" smtClean="0"/>
-              <a:t>5/14/2021</a:t>
+              <a:t>5/18/2023</a:t>
             </a:fld>
             <a:endParaRPr lang="en-US"/>
           </a:p>
@@ -1705,10 +1690,9 @@
           <a:lstStyle/>
           <a:p>
             <a:r>
-              <a:rPr lang="en-US" smtClean="0"/>
+              <a:rPr lang="en-US"/>
               <a:t>Click to edit Master title style</a:t>
             </a:r>
-            <a:endParaRPr lang="en-US"/>
           </a:p>
         </p:txBody>
       </p:sp>
@@ -1729,7 +1713,7 @@
           <a:p>
             <a:fld id="{B77C8AF6-092B-463F-9665-A46E0F51F534}" type="datetimeFigureOut">
               <a:rPr lang="en-US" smtClean="0"/>
-              <a:t>5/14/2021</a:t>
+              <a:t>5/18/2023</a:t>
             </a:fld>
             <a:endParaRPr lang="en-US"/>
           </a:p>
@@ -1824,7 +1808,7 @@
           <a:p>
             <a:fld id="{B77C8AF6-092B-463F-9665-A46E0F51F534}" type="datetimeFigureOut">
               <a:rPr lang="en-US" smtClean="0"/>
-              <a:t>5/14/2021</a:t>
+              <a:t>5/18/2023</a:t>
             </a:fld>
             <a:endParaRPr lang="en-US"/>
           </a:p>
@@ -1927,10 +1911,9 @@
           </a:lstStyle>
           <a:p>
             <a:r>
-              <a:rPr lang="en-US" smtClean="0"/>
+              <a:rPr lang="en-US"/>
               <a:t>Click to edit Master title style</a:t>
             </a:r>
-            <a:endParaRPr lang="en-US"/>
           </a:p>
         </p:txBody>
       </p:sp>
@@ -1984,38 +1967,37 @@
           <a:p>
             <a:pPr lvl="0"/>
             <a:r>
-              <a:rPr lang="en-US" smtClean="0"/>
+              <a:rPr lang="en-US"/>
               <a:t>Edit Master text styles</a:t>
             </a:r>
           </a:p>
           <a:p>
             <a:pPr lvl="1"/>
             <a:r>
-              <a:rPr lang="en-US" smtClean="0"/>
+              <a:rPr lang="en-US"/>
               <a:t>Second level</a:t>
             </a:r>
           </a:p>
           <a:p>
             <a:pPr lvl="2"/>
             <a:r>
-              <a:rPr lang="en-US" smtClean="0"/>
+              <a:rPr lang="en-US"/>
               <a:t>Third level</a:t>
             </a:r>
           </a:p>
           <a:p>
             <a:pPr lvl="3"/>
             <a:r>
-              <a:rPr lang="en-US" smtClean="0"/>
+              <a:rPr lang="en-US"/>
               <a:t>Fourth level</a:t>
             </a:r>
           </a:p>
           <a:p>
             <a:pPr lvl="4"/>
             <a:r>
-              <a:rPr lang="en-US" smtClean="0"/>
+              <a:rPr lang="en-US"/>
               <a:t>Fifth level</a:t>
             </a:r>
-            <a:endParaRPr lang="en-US"/>
           </a:p>
         </p:txBody>
       </p:sp>
@@ -2078,7 +2060,7 @@
           <a:p>
             <a:pPr lvl="0"/>
             <a:r>
-              <a:rPr lang="en-US" smtClean="0"/>
+              <a:rPr lang="en-US"/>
               <a:t>Edit Master text styles</a:t>
             </a:r>
           </a:p>
@@ -2101,7 +2083,7 @@
           <a:p>
             <a:fld id="{B77C8AF6-092B-463F-9665-A46E0F51F534}" type="datetimeFigureOut">
               <a:rPr lang="en-US" smtClean="0"/>
-              <a:t>5/14/2021</a:t>
+              <a:t>5/18/2023</a:t>
             </a:fld>
             <a:endParaRPr lang="en-US"/>
           </a:p>
@@ -2204,10 +2186,9 @@
           </a:lstStyle>
           <a:p>
             <a:r>
-              <a:rPr lang="en-US" smtClean="0"/>
+              <a:rPr lang="en-US"/>
               <a:t>Click to edit Master title style</a:t>
             </a:r>
-            <a:endParaRPr lang="en-US"/>
           </a:p>
         </p:txBody>
       </p:sp>
@@ -2331,7 +2312,7 @@
           <a:p>
             <a:pPr lvl="0"/>
             <a:r>
-              <a:rPr lang="en-US" smtClean="0"/>
+              <a:rPr lang="en-US"/>
               <a:t>Edit Master text styles</a:t>
             </a:r>
           </a:p>
@@ -2354,7 +2335,7 @@
           <a:p>
             <a:fld id="{B77C8AF6-092B-463F-9665-A46E0F51F534}" type="datetimeFigureOut">
               <a:rPr lang="en-US" smtClean="0"/>
-              <a:t>5/14/2021</a:t>
+              <a:t>5/18/2023</a:t>
             </a:fld>
             <a:endParaRPr lang="en-US"/>
           </a:p>
@@ -2463,10 +2444,9 @@
           <a:lstStyle/>
           <a:p>
             <a:r>
-              <a:rPr lang="en-US" smtClean="0"/>
+              <a:rPr lang="en-US"/>
               <a:t>Click to edit Master title style</a:t>
             </a:r>
-            <a:endParaRPr lang="en-US"/>
           </a:p>
         </p:txBody>
       </p:sp>
@@ -2497,38 +2477,37 @@
           <a:p>
             <a:pPr lvl="0"/>
             <a:r>
-              <a:rPr lang="en-US" smtClean="0"/>
+              <a:rPr lang="en-US"/>
               <a:t>Edit Master text styles</a:t>
             </a:r>
           </a:p>
           <a:p>
             <a:pPr lvl="1"/>
             <a:r>
-              <a:rPr lang="en-US" smtClean="0"/>
+              <a:rPr lang="en-US"/>
               <a:t>Second level</a:t>
             </a:r>
           </a:p>
           <a:p>
             <a:pPr lvl="2"/>
             <a:r>
-              <a:rPr lang="en-US" smtClean="0"/>
+              <a:rPr lang="en-US"/>
               <a:t>Third level</a:t>
             </a:r>
           </a:p>
           <a:p>
             <a:pPr lvl="3"/>
             <a:r>
-              <a:rPr lang="en-US" smtClean="0"/>
+              <a:rPr lang="en-US"/>
               <a:t>Fourth level</a:t>
             </a:r>
           </a:p>
           <a:p>
             <a:pPr lvl="4"/>
             <a:r>
-              <a:rPr lang="en-US" smtClean="0"/>
+              <a:rPr lang="en-US"/>
               <a:t>Fifth level</a:t>
             </a:r>
-            <a:endParaRPr lang="en-US"/>
           </a:p>
         </p:txBody>
       </p:sp>
@@ -2567,7 +2546,7 @@
           <a:p>
             <a:fld id="{B77C8AF6-092B-463F-9665-A46E0F51F534}" type="datetimeFigureOut">
               <a:rPr lang="en-US" smtClean="0"/>
-              <a:t>5/14/2021</a:t>
+              <a:t>5/18/2023</a:t>
             </a:fld>
             <a:endParaRPr lang="en-US"/>
           </a:p>
@@ -2993,10 +2972,9 @@
           <a:lstStyle/>
           <a:p>
             <a:r>
-              <a:rPr lang="en-US" dirty="0" smtClean="0"/>
+              <a:rPr lang="en-US" dirty="0"/>
               <a:t>Here is a source discussing various types of IR sensors coding.</a:t>
             </a:r>
-            <a:endParaRPr lang="en-US" dirty="0"/>
           </a:p>
           <a:p>
             <a:pPr lvl="1"/>
@@ -3004,59 +2982,41 @@
               <a:rPr lang="en-US" u="sng" dirty="0">
                 <a:hlinkClick r:id="rId2"/>
               </a:rPr>
-              <a:t>https://</a:t>
-            </a:r>
-            <a:r>
-              <a:rPr lang="en-US" u="sng" dirty="0" smtClean="0">
-                <a:hlinkClick r:id="rId2"/>
-              </a:rPr>
-              <a:t>www.phidgets.com/docs/IR_Remote_Control_Primer</a:t>
-            </a:r>
-            <a:endParaRPr lang="en-US" dirty="0" smtClean="0"/>
+              <a:t>https://www.phidgets.com/docs/IR_Remote_Control_Primer</a:t>
+            </a:r>
+            <a:endParaRPr lang="en-US" dirty="0"/>
           </a:p>
           <a:p>
             <a:pPr lvl="1"/>
             <a:r>
-              <a:rPr lang="en-US" dirty="0" smtClean="0"/>
+              <a:rPr lang="en-US" dirty="0"/>
               <a:t>Most we deal with are “</a:t>
             </a:r>
             <a:r>
               <a:rPr lang="en-US" dirty="0">
                 <a:hlinkClick r:id="rId3"/>
               </a:rPr>
-              <a:t>3.1 1. Pulse Distance Modulation (PDM) or Space </a:t>
-            </a:r>
-            <a:r>
-              <a:rPr lang="en-US" dirty="0" smtClean="0">
-                <a:hlinkClick r:id="rId3"/>
-              </a:rPr>
-              <a:t>Encoding</a:t>
-            </a:r>
-            <a:r>
-              <a:rPr lang="en-US" dirty="0" smtClean="0"/>
+              <a:t>3.1 1. Pulse Distance Modulation (PDM) or Space Encoding</a:t>
+            </a:r>
+            <a:r>
+              <a:rPr lang="en-US" dirty="0"/>
               <a:t>“, and is discussed in these slides</a:t>
             </a:r>
           </a:p>
           <a:p>
             <a:pPr lvl="1"/>
             <a:r>
-              <a:rPr lang="en-US" dirty="0" smtClean="0"/>
+              <a:rPr lang="en-US" dirty="0"/>
               <a:t>Warning: Sony IR controllers are different than this and usually use “</a:t>
             </a:r>
             <a:r>
               <a:rPr lang="en-US" dirty="0">
                 <a:hlinkClick r:id="rId4"/>
               </a:rPr>
-              <a:t>3.2 2. Pulse Width Modulation (PWM) or Pulse </a:t>
-            </a:r>
-            <a:r>
-              <a:rPr lang="en-US" dirty="0" smtClean="0">
-                <a:hlinkClick r:id="rId4"/>
-              </a:rPr>
-              <a:t>Encoding</a:t>
-            </a:r>
-            <a:r>
-              <a:rPr lang="en-US" dirty="0" smtClean="0"/>
+              <a:t>3.2 2. Pulse Width Modulation (PWM) or Pulse Encoding</a:t>
+            </a:r>
+            <a:r>
+              <a:rPr lang="en-US" dirty="0"/>
               <a:t>”</a:t>
             </a:r>
           </a:p>
@@ -3072,13 +3032,6 @@
   <p:clrMapOvr>
     <a:masterClrMapping/>
   </p:clrMapOvr>
-  <p:timing>
-    <p:tnLst>
-      <p:par>
-        <p:cTn id="1" dur="indefinite" restart="never" nodeType="tmRoot"/>
-      </p:par>
-    </p:tnLst>
-  </p:timing>
 </p:sld>
 </file>
 
@@ -3115,10 +3068,9 @@
           <a:lstStyle/>
           <a:p>
             <a:r>
-              <a:rPr lang="en-US" dirty="0" smtClean="0"/>
+              <a:rPr lang="en-US" dirty="0"/>
               <a:t>Clever way to hook up IR sensor!  </a:t>
             </a:r>
-            <a:endParaRPr lang="en-US" dirty="0"/>
           </a:p>
         </p:txBody>
       </p:sp>
@@ -3213,14 +3165,14 @@
           <a:lstStyle/>
           <a:p>
             <a:r>
-              <a:rPr lang="en-US" dirty="0" smtClean="0"/>
+              <a:rPr lang="en-US" dirty="0"/>
               <a:t>left = data;  center = ground; right = </a:t>
             </a:r>
             <a:r>
-              <a:rPr lang="en-US" dirty="0" err="1" smtClean="0"/>
+              <a:rPr lang="en-US" dirty="0" err="1"/>
               <a:t>Vcc</a:t>
             </a:r>
-            <a:endParaRPr lang="en-US" dirty="0" smtClean="0"/>
+            <a:endParaRPr lang="en-US" dirty="0"/>
           </a:p>
           <a:p>
             <a:r>
@@ -3346,13 +3298,6 @@
   <p:clrMapOvr>
     <a:masterClrMapping/>
   </p:clrMapOvr>
-  <p:timing>
-    <p:tnLst>
-      <p:par>
-        <p:cTn id="1" dur="indefinite" restart="never" nodeType="tmRoot"/>
-      </p:par>
-    </p:tnLst>
-  </p:timing>
 </p:sld>
 </file>
 
@@ -3415,109 +3360,89 @@
           <a:lstStyle/>
           <a:p>
             <a:r>
-              <a:rPr lang="en-US" dirty="0" smtClean="0"/>
+              <a:rPr lang="en-US" dirty="0"/>
               <a:t>Typically a max of 32-bits</a:t>
             </a:r>
           </a:p>
           <a:p>
             <a:r>
-              <a:rPr lang="en-US" dirty="0" smtClean="0"/>
-              <a:t>Example timing for Dr York’s </a:t>
-            </a:r>
-            <a:r>
-              <a:rPr lang="en-US" dirty="0" smtClean="0"/>
-              <a:t>IR controller</a:t>
-            </a:r>
-            <a:endParaRPr lang="en-US" dirty="0" smtClean="0"/>
+              <a:rPr lang="en-US" dirty="0"/>
+              <a:t>Example timing for Dr York’s IR controller</a:t>
+            </a:r>
           </a:p>
           <a:p>
             <a:pPr lvl="1"/>
             <a:r>
-              <a:rPr lang="en-US" dirty="0" smtClean="0"/>
+              <a:rPr lang="en-US" dirty="0"/>
               <a:t>Start 1</a:t>
             </a:r>
             <a:r>
-              <a:rPr lang="en-US" baseline="30000" dirty="0" smtClean="0"/>
+              <a:rPr lang="en-US" baseline="30000" dirty="0"/>
               <a:t>st</a:t>
             </a:r>
             <a:r>
-              <a:rPr lang="en-US" dirty="0" smtClean="0"/>
+              <a:rPr lang="en-US" dirty="0"/>
               <a:t> </a:t>
             </a:r>
             <a:r>
-              <a:rPr lang="en-US" dirty="0" err="1" smtClean="0"/>
+              <a:rPr lang="en-US" dirty="0" err="1"/>
               <a:t>halfbit</a:t>
             </a:r>
             <a:r>
-              <a:rPr lang="en-US" dirty="0" smtClean="0"/>
-              <a:t> = ~4368 </a:t>
-            </a:r>
-            <a:r>
-              <a:rPr lang="en-US" dirty="0" err="1" smtClean="0"/>
-              <a:t>usec</a:t>
-            </a:r>
-            <a:endParaRPr lang="en-US" dirty="0" smtClean="0"/>
+              <a:rPr lang="en-US" dirty="0"/>
+              <a:t> = ~4368 nano-sec</a:t>
+            </a:r>
           </a:p>
           <a:p>
             <a:pPr lvl="1"/>
             <a:r>
-              <a:rPr lang="en-US" dirty="0" smtClean="0"/>
+              <a:rPr lang="en-US" dirty="0"/>
               <a:t>Start 2</a:t>
             </a:r>
             <a:r>
-              <a:rPr lang="en-US" baseline="30000" dirty="0" smtClean="0"/>
+              <a:rPr lang="en-US" baseline="30000" dirty="0"/>
               <a:t>nd</a:t>
             </a:r>
             <a:r>
-              <a:rPr lang="en-US" dirty="0" smtClean="0"/>
+              <a:rPr lang="en-US" dirty="0"/>
               <a:t> </a:t>
             </a:r>
             <a:r>
-              <a:rPr lang="en-US" dirty="0" err="1" smtClean="0"/>
+              <a:rPr lang="en-US" dirty="0" err="1"/>
               <a:t>halfbit</a:t>
             </a:r>
             <a:r>
-              <a:rPr lang="en-US" dirty="0" smtClean="0"/>
-              <a:t> = ~4368 </a:t>
-            </a:r>
-            <a:r>
-              <a:rPr lang="en-US" dirty="0" err="1" smtClean="0"/>
-              <a:t>usec</a:t>
-            </a:r>
-            <a:endParaRPr lang="en-US" dirty="0" smtClean="0"/>
+              <a:rPr lang="en-US" dirty="0"/>
+              <a:t> = ~4368 nano-sec</a:t>
+            </a:r>
           </a:p>
           <a:p>
             <a:pPr lvl="1"/>
             <a:r>
-              <a:rPr lang="en-US" dirty="0" smtClean="0"/>
+              <a:rPr lang="en-US" dirty="0"/>
               <a:t>Data 1</a:t>
             </a:r>
             <a:r>
-              <a:rPr lang="en-US" baseline="30000" dirty="0" smtClean="0"/>
+              <a:rPr lang="en-US" baseline="30000" dirty="0"/>
               <a:t>st</a:t>
             </a:r>
             <a:r>
-              <a:rPr lang="en-US" dirty="0" smtClean="0"/>
+              <a:rPr lang="en-US" dirty="0"/>
               <a:t> </a:t>
             </a:r>
             <a:r>
-              <a:rPr lang="en-US" dirty="0" err="1" smtClean="0"/>
+              <a:rPr lang="en-US" dirty="0" err="1"/>
               <a:t>halfbit</a:t>
             </a:r>
             <a:r>
-              <a:rPr lang="en-US" dirty="0" smtClean="0"/>
-              <a:t> = ~510 </a:t>
-            </a:r>
-            <a:r>
-              <a:rPr lang="en-US" dirty="0" err="1" smtClean="0"/>
-              <a:t>usec</a:t>
-            </a:r>
-            <a:endParaRPr lang="en-US" dirty="0" smtClean="0"/>
+              <a:rPr lang="en-US" dirty="0"/>
+              <a:t> = ~510 nano-sec</a:t>
+            </a:r>
           </a:p>
           <a:p>
             <a:pPr lvl="1"/>
             <a:r>
-              <a:rPr lang="en-US" dirty="0" smtClean="0">
+              <a:rPr lang="en-US" dirty="0">
                 <a:solidFill>
                   <a:srgbClr val="FF0000"/>
                 </a:solidFill>
@@ -3525,7 +3450,7 @@
               <a:t>Data 2</a:t>
             </a:r>
             <a:r>
-              <a:rPr lang="en-US" baseline="30000" dirty="0" smtClean="0">
+              <a:rPr lang="en-US" baseline="30000" dirty="0">
                 <a:solidFill>
                   <a:srgbClr val="FF0000"/>
                 </a:solidFill>
@@ -3533,7 +3458,7 @@
               <a:t>nd</a:t>
             </a:r>
             <a:r>
-              <a:rPr lang="en-US" dirty="0" smtClean="0">
+              <a:rPr lang="en-US" dirty="0">
                 <a:solidFill>
                   <a:srgbClr val="FF0000"/>
                 </a:solidFill>
@@ -3544,68 +3469,54 @@
           <a:p>
             <a:pPr lvl="2"/>
             <a:r>
-              <a:rPr lang="en-US" dirty="0" smtClean="0"/>
+              <a:rPr lang="en-US" dirty="0"/>
               <a:t>Data 2</a:t>
             </a:r>
             <a:r>
-              <a:rPr lang="en-US" baseline="30000" dirty="0" smtClean="0"/>
+              <a:rPr lang="en-US" baseline="30000" dirty="0"/>
               <a:t>nd</a:t>
             </a:r>
             <a:r>
-              <a:rPr lang="en-US" dirty="0" smtClean="0"/>
+              <a:rPr lang="en-US" dirty="0"/>
               <a:t> </a:t>
             </a:r>
             <a:r>
-              <a:rPr lang="en-US" dirty="0" err="1" smtClean="0"/>
+              <a:rPr lang="en-US" dirty="0" err="1"/>
               <a:t>halfbit</a:t>
             </a:r>
             <a:r>
-              <a:rPr lang="en-US" dirty="0" smtClean="0"/>
-              <a:t> for logic 0 = ~510 </a:t>
-            </a:r>
-            <a:r>
-              <a:rPr lang="en-US" dirty="0" err="1" smtClean="0"/>
-              <a:t>usec</a:t>
-            </a:r>
-            <a:endParaRPr lang="en-US" dirty="0" smtClean="0"/>
+              <a:rPr lang="en-US" dirty="0"/>
+              <a:t> for logic 0 = ~510 nano-sec</a:t>
+            </a:r>
           </a:p>
           <a:p>
             <a:pPr lvl="2"/>
             <a:r>
-              <a:rPr lang="en-US" dirty="0" smtClean="0"/>
+              <a:rPr lang="en-US" dirty="0"/>
               <a:t>Data 2</a:t>
             </a:r>
             <a:r>
-              <a:rPr lang="en-US" baseline="30000" dirty="0" smtClean="0"/>
+              <a:rPr lang="en-US" baseline="30000" dirty="0"/>
               <a:t>nd</a:t>
             </a:r>
             <a:r>
-              <a:rPr lang="en-US" dirty="0" smtClean="0"/>
+              <a:rPr lang="en-US" dirty="0"/>
               <a:t> </a:t>
             </a:r>
             <a:r>
-              <a:rPr lang="en-US" dirty="0" err="1" smtClean="0"/>
+              <a:rPr lang="en-US" dirty="0" err="1"/>
               <a:t>halfbit</a:t>
             </a:r>
             <a:r>
-              <a:rPr lang="en-US" dirty="0" smtClean="0"/>
-              <a:t> for logic 1 = ~1620 </a:t>
-            </a:r>
-            <a:r>
-              <a:rPr lang="en-US" dirty="0" err="1" smtClean="0"/>
-              <a:t>usec</a:t>
-            </a:r>
-            <a:endParaRPr lang="en-US" dirty="0" smtClean="0"/>
+              <a:rPr lang="en-US" dirty="0"/>
+              <a:t> for logic 1 = ~1620 nano-sec</a:t>
+            </a:r>
           </a:p>
           <a:p>
             <a:pPr lvl="1"/>
             <a:r>
-              <a:rPr lang="en-US" dirty="0" smtClean="0"/>
-              <a:t>Stop </a:t>
-            </a:r>
-            <a:r>
               <a:rPr lang="en-US" dirty="0"/>
-              <a:t>1</a:t>
+              <a:t>Stop 1</a:t>
             </a:r>
             <a:r>
               <a:rPr lang="en-US" baseline="30000" dirty="0"/>
@@ -3621,23 +3532,14 @@
             </a:r>
             <a:r>
               <a:rPr lang="en-US" dirty="0"/>
-              <a:t> = ~4368 </a:t>
-            </a:r>
-            <a:r>
-              <a:rPr lang="en-US" dirty="0" err="1"/>
-              <a:t>usec</a:t>
-            </a:r>
-            <a:endParaRPr lang="en-US" dirty="0"/>
+              <a:t> = ~4368 nano-sec</a:t>
+            </a:r>
           </a:p>
           <a:p>
             <a:pPr lvl="1"/>
             <a:r>
-              <a:rPr lang="en-US" dirty="0" smtClean="0"/>
-              <a:t>Stop </a:t>
-            </a:r>
-            <a:r>
               <a:rPr lang="en-US" dirty="0"/>
-              <a:t>2</a:t>
+              <a:t>Stop 2</a:t>
             </a:r>
             <a:r>
               <a:rPr lang="en-US" baseline="30000" dirty="0"/>
@@ -3653,13 +3555,8 @@
             </a:r>
             <a:r>
               <a:rPr lang="en-US" dirty="0"/>
-              <a:t> = </a:t>
-            </a:r>
-            <a:r>
-              <a:rPr lang="en-US" dirty="0" smtClean="0"/>
-              <a:t>very, very long</a:t>
-            </a:r>
-            <a:endParaRPr lang="en-US" dirty="0"/>
+              <a:t> = very, very long</a:t>
+            </a:r>
           </a:p>
           <a:p>
             <a:pPr marL="457200" lvl="1" indent="0">
@@ -3678,67 +3575,46 @@
               <a:buNone/>
             </a:pPr>
             <a:r>
-              <a:rPr lang="en-US" dirty="0" smtClean="0"/>
+              <a:rPr lang="en-US" dirty="0"/>
               <a:t>Decoding this is similar to HW#8; </a:t>
             </a:r>
-            <a:endParaRPr lang="en-US" dirty="0" smtClean="0"/>
           </a:p>
           <a:p>
             <a:pPr marL="457200" lvl="1" indent="0">
               <a:buNone/>
             </a:pPr>
             <a:r>
-              <a:rPr lang="en-US" dirty="0" smtClean="0"/>
-              <a:t>For </a:t>
-            </a:r>
-            <a:r>
-              <a:rPr lang="en-US" dirty="0" smtClean="0"/>
-              <a:t>Dr York’s controller: follow the up/down edges 32 times (or until 2</a:t>
-            </a:r>
-            <a:r>
-              <a:rPr lang="en-US" baseline="30000" dirty="0" smtClean="0"/>
+              <a:rPr lang="en-US" dirty="0"/>
+              <a:t>For Dr York’s controller: follow the up/down edges 32 times (or until 2</a:t>
+            </a:r>
+            <a:r>
+              <a:rPr lang="en-US" baseline="30000" dirty="0"/>
               <a:t>nd</a:t>
             </a:r>
             <a:r>
-              <a:rPr lang="en-US" dirty="0" smtClean="0"/>
+              <a:rPr lang="en-US" dirty="0"/>
               <a:t> </a:t>
             </a:r>
             <a:r>
-              <a:rPr lang="en-US" dirty="0" err="1" smtClean="0"/>
+              <a:rPr lang="en-US" dirty="0" err="1"/>
               <a:t>halfbit</a:t>
             </a:r>
             <a:r>
-              <a:rPr lang="en-US" dirty="0" smtClean="0"/>
-              <a:t> is much greater than 1620 </a:t>
-            </a:r>
-            <a:r>
-              <a:rPr lang="en-US" dirty="0" err="1" smtClean="0"/>
-              <a:t>usec</a:t>
-            </a:r>
-            <a:r>
-              <a:rPr lang="en-US" dirty="0" smtClean="0"/>
-              <a:t>), at each rising edge beginning a Data 2</a:t>
-            </a:r>
-            <a:r>
-              <a:rPr lang="en-US" baseline="30000" dirty="0" smtClean="0"/>
+              <a:rPr lang="en-US" dirty="0"/>
+              <a:t> is much greater than 1620 nano-sec), at each rising edge beginning a Data 2</a:t>
+            </a:r>
+            <a:r>
+              <a:rPr lang="en-US" baseline="30000" dirty="0"/>
               <a:t>nd</a:t>
             </a:r>
             <a:r>
-              <a:rPr lang="en-US" dirty="0" smtClean="0"/>
-              <a:t> half-bit, restart a counter, stop counter on falling edge, if time &lt; 1000 </a:t>
-            </a:r>
-            <a:r>
-              <a:rPr lang="en-US" dirty="0" err="1" smtClean="0"/>
-              <a:t>usec</a:t>
-            </a:r>
-            <a:r>
-              <a:rPr lang="en-US" dirty="0" smtClean="0"/>
-              <a:t>, then store a ‘0’, else store a ‘1’, in a shift register</a:t>
+              <a:rPr lang="en-US" dirty="0"/>
+              <a:t> half-bit, restart a counter, stop counter on falling edge, if time &lt; 1000 nano-sec, then store a ‘0’, else store a ‘1’, in a shift register</a:t>
             </a:r>
           </a:p>
           <a:p>
             <a:pPr lvl="1"/>
-            <a:endParaRPr lang="en-US" dirty="0" smtClean="0"/>
+            <a:endParaRPr lang="en-US" dirty="0"/>
           </a:p>
           <a:p>
             <a:pPr lvl="1"/>
@@ -3816,10 +3692,9 @@
           <a:lstStyle/>
           <a:p>
             <a:r>
-              <a:rPr lang="en-US" dirty="0" smtClean="0"/>
+              <a:rPr lang="en-US" dirty="0"/>
               <a:t>Every companies controller usually have different codes and timings</a:t>
             </a:r>
-            <a:endParaRPr lang="en-US" dirty="0"/>
           </a:p>
         </p:txBody>
       </p:sp>
@@ -3839,14 +3714,14 @@
           <a:lstStyle/>
           <a:p>
             <a:r>
-              <a:rPr lang="en-US" dirty="0" smtClean="0"/>
+              <a:rPr lang="en-US" dirty="0"/>
               <a:t>How to get the codes and timings?</a:t>
             </a:r>
           </a:p>
           <a:p>
             <a:pPr lvl="1"/>
             <a:r>
-              <a:rPr lang="en-US" dirty="0" smtClean="0"/>
+              <a:rPr lang="en-US" dirty="0"/>
               <a:t>Use a Logic Analyzer!</a:t>
             </a:r>
           </a:p>

</xml_diff>